<commit_message>
- fixed tests and added two new testdata - Tests cover now a bigger range of cases
</commit_message>
<xml_diff>
--- a/Testing/TestData/template.pptx
+++ b/Testing/TestData/template.pptx
@@ -264,7 +264,7 @@
           <a:p>
             <a:fld id="{9D2FB7C9-49EE-466C-A65F-C5D0C768F483}" type="datetimeFigureOut">
               <a:rPr lang="de-DE" smtClean="0"/>
-              <a:t>09.12.2024</a:t>
+              <a:t>05.01.2025</a:t>
             </a:fld>
             <a:endParaRPr lang="de-DE"/>
           </a:p>
@@ -318,7 +318,7 @@
           <a:p>
             <a:fld id="{126D2EC5-C482-4BDE-8245-5A6ED818881F}" type="slidenum">
               <a:rPr lang="de-DE" smtClean="0"/>
-              <a:t>‹#›</a:t>
+              <a:t>‹Nr.›</a:t>
             </a:fld>
             <a:endParaRPr lang="de-DE"/>
           </a:p>
@@ -464,7 +464,7 @@
           <a:p>
             <a:fld id="{9D2FB7C9-49EE-466C-A65F-C5D0C768F483}" type="datetimeFigureOut">
               <a:rPr lang="de-DE" smtClean="0"/>
-              <a:t>09.12.2024</a:t>
+              <a:t>05.01.2025</a:t>
             </a:fld>
             <a:endParaRPr lang="de-DE"/>
           </a:p>
@@ -518,7 +518,7 @@
           <a:p>
             <a:fld id="{126D2EC5-C482-4BDE-8245-5A6ED818881F}" type="slidenum">
               <a:rPr lang="de-DE" smtClean="0"/>
-              <a:t>‹#›</a:t>
+              <a:t>‹Nr.›</a:t>
             </a:fld>
             <a:endParaRPr lang="de-DE"/>
           </a:p>
@@ -674,7 +674,7 @@
           <a:p>
             <a:fld id="{9D2FB7C9-49EE-466C-A65F-C5D0C768F483}" type="datetimeFigureOut">
               <a:rPr lang="de-DE" smtClean="0"/>
-              <a:t>09.12.2024</a:t>
+              <a:t>05.01.2025</a:t>
             </a:fld>
             <a:endParaRPr lang="de-DE"/>
           </a:p>
@@ -728,7 +728,7 @@
           <a:p>
             <a:fld id="{126D2EC5-C482-4BDE-8245-5A6ED818881F}" type="slidenum">
               <a:rPr lang="de-DE" smtClean="0"/>
-              <a:t>‹#›</a:t>
+              <a:t>‹Nr.›</a:t>
             </a:fld>
             <a:endParaRPr lang="de-DE"/>
           </a:p>
@@ -874,7 +874,7 @@
           <a:p>
             <a:fld id="{9D2FB7C9-49EE-466C-A65F-C5D0C768F483}" type="datetimeFigureOut">
               <a:rPr lang="de-DE" smtClean="0"/>
-              <a:t>09.12.2024</a:t>
+              <a:t>05.01.2025</a:t>
             </a:fld>
             <a:endParaRPr lang="de-DE"/>
           </a:p>
@@ -928,7 +928,7 @@
           <a:p>
             <a:fld id="{126D2EC5-C482-4BDE-8245-5A6ED818881F}" type="slidenum">
               <a:rPr lang="de-DE" smtClean="0"/>
-              <a:t>‹#›</a:t>
+              <a:t>‹Nr.›</a:t>
             </a:fld>
             <a:endParaRPr lang="de-DE"/>
           </a:p>
@@ -1150,7 +1150,7 @@
           <a:p>
             <a:fld id="{9D2FB7C9-49EE-466C-A65F-C5D0C768F483}" type="datetimeFigureOut">
               <a:rPr lang="de-DE" smtClean="0"/>
-              <a:t>09.12.2024</a:t>
+              <a:t>05.01.2025</a:t>
             </a:fld>
             <a:endParaRPr lang="de-DE"/>
           </a:p>
@@ -1204,7 +1204,7 @@
           <a:p>
             <a:fld id="{126D2EC5-C482-4BDE-8245-5A6ED818881F}" type="slidenum">
               <a:rPr lang="de-DE" smtClean="0"/>
-              <a:t>‹#›</a:t>
+              <a:t>‹Nr.›</a:t>
             </a:fld>
             <a:endParaRPr lang="de-DE"/>
           </a:p>
@@ -1418,7 +1418,7 @@
           <a:p>
             <a:fld id="{9D2FB7C9-49EE-466C-A65F-C5D0C768F483}" type="datetimeFigureOut">
               <a:rPr lang="de-DE" smtClean="0"/>
-              <a:t>09.12.2024</a:t>
+              <a:t>05.01.2025</a:t>
             </a:fld>
             <a:endParaRPr lang="de-DE"/>
           </a:p>
@@ -1472,7 +1472,7 @@
           <a:p>
             <a:fld id="{126D2EC5-C482-4BDE-8245-5A6ED818881F}" type="slidenum">
               <a:rPr lang="de-DE" smtClean="0"/>
-              <a:t>‹#›</a:t>
+              <a:t>‹Nr.›</a:t>
             </a:fld>
             <a:endParaRPr lang="de-DE"/>
           </a:p>
@@ -1833,7 +1833,7 @@
           <a:p>
             <a:fld id="{9D2FB7C9-49EE-466C-A65F-C5D0C768F483}" type="datetimeFigureOut">
               <a:rPr lang="de-DE" smtClean="0"/>
-              <a:t>09.12.2024</a:t>
+              <a:t>05.01.2025</a:t>
             </a:fld>
             <a:endParaRPr lang="de-DE"/>
           </a:p>
@@ -1887,7 +1887,7 @@
           <a:p>
             <a:fld id="{126D2EC5-C482-4BDE-8245-5A6ED818881F}" type="slidenum">
               <a:rPr lang="de-DE" smtClean="0"/>
-              <a:t>‹#›</a:t>
+              <a:t>‹Nr.›</a:t>
             </a:fld>
             <a:endParaRPr lang="de-DE"/>
           </a:p>
@@ -1975,7 +1975,7 @@
           <a:p>
             <a:fld id="{9D2FB7C9-49EE-466C-A65F-C5D0C768F483}" type="datetimeFigureOut">
               <a:rPr lang="de-DE" smtClean="0"/>
-              <a:t>09.12.2024</a:t>
+              <a:t>05.01.2025</a:t>
             </a:fld>
             <a:endParaRPr lang="de-DE"/>
           </a:p>
@@ -2029,7 +2029,7 @@
           <a:p>
             <a:fld id="{126D2EC5-C482-4BDE-8245-5A6ED818881F}" type="slidenum">
               <a:rPr lang="de-DE" smtClean="0"/>
-              <a:t>‹#›</a:t>
+              <a:t>‹Nr.›</a:t>
             </a:fld>
             <a:endParaRPr lang="de-DE"/>
           </a:p>
@@ -2088,7 +2088,7 @@
           <a:p>
             <a:fld id="{9D2FB7C9-49EE-466C-A65F-C5D0C768F483}" type="datetimeFigureOut">
               <a:rPr lang="de-DE" smtClean="0"/>
-              <a:t>09.12.2024</a:t>
+              <a:t>05.01.2025</a:t>
             </a:fld>
             <a:endParaRPr lang="de-DE"/>
           </a:p>
@@ -2142,7 +2142,7 @@
           <a:p>
             <a:fld id="{126D2EC5-C482-4BDE-8245-5A6ED818881F}" type="slidenum">
               <a:rPr lang="de-DE" smtClean="0"/>
-              <a:t>‹#›</a:t>
+              <a:t>‹Nr.›</a:t>
             </a:fld>
             <a:endParaRPr lang="de-DE"/>
           </a:p>
@@ -2401,7 +2401,7 @@
           <a:p>
             <a:fld id="{9D2FB7C9-49EE-466C-A65F-C5D0C768F483}" type="datetimeFigureOut">
               <a:rPr lang="de-DE" smtClean="0"/>
-              <a:t>09.12.2024</a:t>
+              <a:t>05.01.2025</a:t>
             </a:fld>
             <a:endParaRPr lang="de-DE"/>
           </a:p>
@@ -2455,7 +2455,7 @@
           <a:p>
             <a:fld id="{126D2EC5-C482-4BDE-8245-5A6ED818881F}" type="slidenum">
               <a:rPr lang="de-DE" smtClean="0"/>
-              <a:t>‹#›</a:t>
+              <a:t>‹Nr.›</a:t>
             </a:fld>
             <a:endParaRPr lang="de-DE"/>
           </a:p>
@@ -2690,7 +2690,7 @@
           <a:p>
             <a:fld id="{9D2FB7C9-49EE-466C-A65F-C5D0C768F483}" type="datetimeFigureOut">
               <a:rPr lang="de-DE" smtClean="0"/>
-              <a:t>09.12.2024</a:t>
+              <a:t>05.01.2025</a:t>
             </a:fld>
             <a:endParaRPr lang="de-DE"/>
           </a:p>
@@ -2744,7 +2744,7 @@
           <a:p>
             <a:fld id="{126D2EC5-C482-4BDE-8245-5A6ED818881F}" type="slidenum">
               <a:rPr lang="de-DE" smtClean="0"/>
-              <a:t>‹#›</a:t>
+              <a:t>‹Nr.›</a:t>
             </a:fld>
             <a:endParaRPr lang="de-DE"/>
           </a:p>
@@ -2933,7 +2933,7 @@
           <a:p>
             <a:fld id="{9D2FB7C9-49EE-466C-A65F-C5D0C768F483}" type="datetimeFigureOut">
               <a:rPr lang="de-DE" smtClean="0"/>
-              <a:t>09.12.2024</a:t>
+              <a:t>05.01.2025</a:t>
             </a:fld>
             <a:endParaRPr lang="de-DE"/>
           </a:p>
@@ -3023,7 +3023,7 @@
           <a:p>
             <a:fld id="{126D2EC5-C482-4BDE-8245-5A6ED818881F}" type="slidenum">
               <a:rPr lang="de-DE" smtClean="0"/>
-              <a:t>‹#›</a:t>
+              <a:t>‹Nr.›</a:t>
             </a:fld>
             <a:endParaRPr lang="de-DE"/>
           </a:p>
@@ -5531,7 +5531,7 @@
       </p:sp>
       <p:sp>
         <p:nvSpPr>
-          <p:cNvPr id="4" name="Content Placeholder 2">
+          <p:cNvPr id="4" name="TestShape">
             <a:extLst>
               <a:ext uri="{FF2B5EF4-FFF2-40B4-BE49-F238E27FC236}">
                 <a16:creationId xmlns:a16="http://schemas.microsoft.com/office/drawing/2014/main" id="{7C2C2509-C22D-6742-A907-A54429D0BB16}"/>
@@ -5722,9 +5722,18 @@
           </a:lstStyle>
           <a:p>
             <a:r>
+              <a:rPr lang="de-DE" dirty="0" err="1"/>
+              <a:t>TestShape</a:t>
+            </a:r>
+            <a:r>
               <a:rPr lang="de-DE" dirty="0"/>
-              <a:t>Platzhaltertext 2</a:t>
-            </a:r>
+              <a:t> </a:t>
+            </a:r>
+            <a:r>
+              <a:rPr lang="de-DE" dirty="0" err="1"/>
+              <a:t>PlaceHolder</a:t>
+            </a:r>
+            <a:endParaRPr lang="de-DE" dirty="0"/>
           </a:p>
         </p:txBody>
       </p:sp>

</xml_diff>